<commit_message>
Finished implementing the SCXML, corrected an arrow in the model and readme updated.
</commit_message>
<xml_diff>
--- a/click-widget-model.pptx
+++ b/click-widget-model.pptx
@@ -288,7 +288,7 @@
           <a:p>
             <a:fld id="{534207D3-C979-408C-A316-B91D25D2CE33}" type="datetimeFigureOut">
               <a:rPr lang="en-GB" smtClean="0"/>
-              <a:t>18/01/2021</a:t>
+              <a:t>20/01/2021</a:t>
             </a:fld>
             <a:endParaRPr lang="en-GB"/>
           </a:p>
@@ -458,7 +458,7 @@
           <a:p>
             <a:fld id="{534207D3-C979-408C-A316-B91D25D2CE33}" type="datetimeFigureOut">
               <a:rPr lang="en-GB" smtClean="0"/>
-              <a:t>18/01/2021</a:t>
+              <a:t>20/01/2021</a:t>
             </a:fld>
             <a:endParaRPr lang="en-GB"/>
           </a:p>
@@ -638,7 +638,7 @@
           <a:p>
             <a:fld id="{534207D3-C979-408C-A316-B91D25D2CE33}" type="datetimeFigureOut">
               <a:rPr lang="en-GB" smtClean="0"/>
-              <a:t>18/01/2021</a:t>
+              <a:t>20/01/2021</a:t>
             </a:fld>
             <a:endParaRPr lang="en-GB"/>
           </a:p>
@@ -808,7 +808,7 @@
           <a:p>
             <a:fld id="{534207D3-C979-408C-A316-B91D25D2CE33}" type="datetimeFigureOut">
               <a:rPr lang="en-GB" smtClean="0"/>
-              <a:t>18/01/2021</a:t>
+              <a:t>20/01/2021</a:t>
             </a:fld>
             <a:endParaRPr lang="en-GB"/>
           </a:p>
@@ -1054,7 +1054,7 @@
           <a:p>
             <a:fld id="{534207D3-C979-408C-A316-B91D25D2CE33}" type="datetimeFigureOut">
               <a:rPr lang="en-GB" smtClean="0"/>
-              <a:t>18/01/2021</a:t>
+              <a:t>20/01/2021</a:t>
             </a:fld>
             <a:endParaRPr lang="en-GB"/>
           </a:p>
@@ -1342,7 +1342,7 @@
           <a:p>
             <a:fld id="{534207D3-C979-408C-A316-B91D25D2CE33}" type="datetimeFigureOut">
               <a:rPr lang="en-GB" smtClean="0"/>
-              <a:t>18/01/2021</a:t>
+              <a:t>20/01/2021</a:t>
             </a:fld>
             <a:endParaRPr lang="en-GB"/>
           </a:p>
@@ -1764,7 +1764,7 @@
           <a:p>
             <a:fld id="{534207D3-C979-408C-A316-B91D25D2CE33}" type="datetimeFigureOut">
               <a:rPr lang="en-GB" smtClean="0"/>
-              <a:t>18/01/2021</a:t>
+              <a:t>20/01/2021</a:t>
             </a:fld>
             <a:endParaRPr lang="en-GB"/>
           </a:p>
@@ -1882,7 +1882,7 @@
           <a:p>
             <a:fld id="{534207D3-C979-408C-A316-B91D25D2CE33}" type="datetimeFigureOut">
               <a:rPr lang="en-GB" smtClean="0"/>
-              <a:t>18/01/2021</a:t>
+              <a:t>20/01/2021</a:t>
             </a:fld>
             <a:endParaRPr lang="en-GB"/>
           </a:p>
@@ -1977,7 +1977,7 @@
           <a:p>
             <a:fld id="{534207D3-C979-408C-A316-B91D25D2CE33}" type="datetimeFigureOut">
               <a:rPr lang="en-GB" smtClean="0"/>
-              <a:t>18/01/2021</a:t>
+              <a:t>20/01/2021</a:t>
             </a:fld>
             <a:endParaRPr lang="en-GB"/>
           </a:p>
@@ -2254,7 +2254,7 @@
           <a:p>
             <a:fld id="{534207D3-C979-408C-A316-B91D25D2CE33}" type="datetimeFigureOut">
               <a:rPr lang="en-GB" smtClean="0"/>
-              <a:t>18/01/2021</a:t>
+              <a:t>20/01/2021</a:t>
             </a:fld>
             <a:endParaRPr lang="en-GB"/>
           </a:p>
@@ -2507,7 +2507,7 @@
           <a:p>
             <a:fld id="{534207D3-C979-408C-A316-B91D25D2CE33}" type="datetimeFigureOut">
               <a:rPr lang="en-GB" smtClean="0"/>
-              <a:t>18/01/2021</a:t>
+              <a:t>20/01/2021</a:t>
             </a:fld>
             <a:endParaRPr lang="en-GB"/>
           </a:p>
@@ -2720,7 +2720,7 @@
           <a:p>
             <a:fld id="{534207D3-C979-408C-A316-B91D25D2CE33}" type="datetimeFigureOut">
               <a:rPr lang="en-GB" smtClean="0"/>
-              <a:t>18/01/2021</a:t>
+              <a:t>20/01/2021</a:t>
             </a:fld>
             <a:endParaRPr lang="en-GB"/>
           </a:p>
@@ -3737,7 +3737,7 @@
         </p:nvCxnSpPr>
         <p:spPr>
           <a:xfrm flipV="1">
-            <a:off x="921594" y="3288759"/>
+            <a:off x="1619672" y="3288759"/>
             <a:ext cx="0" cy="1697698"/>
           </a:xfrm>
           <a:prstGeom prst="straightConnector1">
@@ -3770,7 +3770,7 @@
         </p:nvCxnSpPr>
         <p:spPr>
           <a:xfrm>
-            <a:off x="1619672" y="3284984"/>
+            <a:off x="899592" y="3284984"/>
             <a:ext cx="0" cy="1701473"/>
           </a:xfrm>
           <a:prstGeom prst="straightConnector1">

</xml_diff>

<commit_message>
Fixed the rest state problem, updated pptx, pdf and scxml and readme to reflect the changes.
</commit_message>
<xml_diff>
--- a/click-widget-model.pptx
+++ b/click-widget-model.pptx
@@ -288,7 +288,7 @@
           <a:p>
             <a:fld id="{534207D3-C979-408C-A316-B91D25D2CE33}" type="datetimeFigureOut">
               <a:rPr lang="en-GB" smtClean="0"/>
-              <a:t>20/01/2021</a:t>
+              <a:t>28/01/2021</a:t>
             </a:fld>
             <a:endParaRPr lang="en-GB"/>
           </a:p>
@@ -458,7 +458,7 @@
           <a:p>
             <a:fld id="{534207D3-C979-408C-A316-B91D25D2CE33}" type="datetimeFigureOut">
               <a:rPr lang="en-GB" smtClean="0"/>
-              <a:t>20/01/2021</a:t>
+              <a:t>28/01/2021</a:t>
             </a:fld>
             <a:endParaRPr lang="en-GB"/>
           </a:p>
@@ -638,7 +638,7 @@
           <a:p>
             <a:fld id="{534207D3-C979-408C-A316-B91D25D2CE33}" type="datetimeFigureOut">
               <a:rPr lang="en-GB" smtClean="0"/>
-              <a:t>20/01/2021</a:t>
+              <a:t>28/01/2021</a:t>
             </a:fld>
             <a:endParaRPr lang="en-GB"/>
           </a:p>
@@ -808,7 +808,7 @@
           <a:p>
             <a:fld id="{534207D3-C979-408C-A316-B91D25D2CE33}" type="datetimeFigureOut">
               <a:rPr lang="en-GB" smtClean="0"/>
-              <a:t>20/01/2021</a:t>
+              <a:t>28/01/2021</a:t>
             </a:fld>
             <a:endParaRPr lang="en-GB"/>
           </a:p>
@@ -1054,7 +1054,7 @@
           <a:p>
             <a:fld id="{534207D3-C979-408C-A316-B91D25D2CE33}" type="datetimeFigureOut">
               <a:rPr lang="en-GB" smtClean="0"/>
-              <a:t>20/01/2021</a:t>
+              <a:t>28/01/2021</a:t>
             </a:fld>
             <a:endParaRPr lang="en-GB"/>
           </a:p>
@@ -1342,7 +1342,7 @@
           <a:p>
             <a:fld id="{534207D3-C979-408C-A316-B91D25D2CE33}" type="datetimeFigureOut">
               <a:rPr lang="en-GB" smtClean="0"/>
-              <a:t>20/01/2021</a:t>
+              <a:t>28/01/2021</a:t>
             </a:fld>
             <a:endParaRPr lang="en-GB"/>
           </a:p>
@@ -1764,7 +1764,7 @@
           <a:p>
             <a:fld id="{534207D3-C979-408C-A316-B91D25D2CE33}" type="datetimeFigureOut">
               <a:rPr lang="en-GB" smtClean="0"/>
-              <a:t>20/01/2021</a:t>
+              <a:t>28/01/2021</a:t>
             </a:fld>
             <a:endParaRPr lang="en-GB"/>
           </a:p>
@@ -1882,7 +1882,7 @@
           <a:p>
             <a:fld id="{534207D3-C979-408C-A316-B91D25D2CE33}" type="datetimeFigureOut">
               <a:rPr lang="en-GB" smtClean="0"/>
-              <a:t>20/01/2021</a:t>
+              <a:t>28/01/2021</a:t>
             </a:fld>
             <a:endParaRPr lang="en-GB"/>
           </a:p>
@@ -1977,7 +1977,7 @@
           <a:p>
             <a:fld id="{534207D3-C979-408C-A316-B91D25D2CE33}" type="datetimeFigureOut">
               <a:rPr lang="en-GB" smtClean="0"/>
-              <a:t>20/01/2021</a:t>
+              <a:t>28/01/2021</a:t>
             </a:fld>
             <a:endParaRPr lang="en-GB"/>
           </a:p>
@@ -2254,7 +2254,7 @@
           <a:p>
             <a:fld id="{534207D3-C979-408C-A316-B91D25D2CE33}" type="datetimeFigureOut">
               <a:rPr lang="en-GB" smtClean="0"/>
-              <a:t>20/01/2021</a:t>
+              <a:t>28/01/2021</a:t>
             </a:fld>
             <a:endParaRPr lang="en-GB"/>
           </a:p>
@@ -2507,7 +2507,7 @@
           <a:p>
             <a:fld id="{534207D3-C979-408C-A316-B91D25D2CE33}" type="datetimeFigureOut">
               <a:rPr lang="en-GB" smtClean="0"/>
-              <a:t>20/01/2021</a:t>
+              <a:t>28/01/2021</a:t>
             </a:fld>
             <a:endParaRPr lang="en-GB"/>
           </a:p>
@@ -2720,7 +2720,7 @@
           <a:p>
             <a:fld id="{534207D3-C979-408C-A316-B91D25D2CE33}" type="datetimeFigureOut">
               <a:rPr lang="en-GB" smtClean="0"/>
-              <a:t>20/01/2021</a:t>
+              <a:t>28/01/2021</a:t>
             </a:fld>
             <a:endParaRPr lang="en-GB"/>
           </a:p>
@@ -4077,8 +4077,8 @@
         </p:nvSpPr>
         <p:spPr>
           <a:xfrm>
-            <a:off x="3419872" y="2456021"/>
-            <a:ext cx="1332148" cy="369332"/>
+            <a:off x="3005826" y="2456021"/>
+            <a:ext cx="2160240" cy="369332"/>
           </a:xfrm>
           <a:prstGeom prst="rect">
             <a:avLst/>
@@ -4093,8 +4093,20 @@
           <a:p>
             <a:pPr algn="ctr"/>
             <a:r>
+              <a:rPr lang="it-IT" dirty="0"/>
+              <a:t>m</a:t>
+            </a:r>
+            <a:r>
               <a:rPr lang="it-IT" dirty="0" smtClean="0"/>
-              <a:t>mouseover</a:t>
+              <a:t>ouseover(</a:t>
+            </a:r>
+            <a:r>
+              <a:rPr lang="it-IT" dirty="0" err="1" smtClean="0"/>
+              <a:t>region</a:t>
+            </a:r>
+            <a:r>
+              <a:rPr lang="it-IT" dirty="0" smtClean="0"/>
+              <a:t>)</a:t>
             </a:r>
             <a:endParaRPr lang="en-GB" dirty="0"/>
           </a:p>
@@ -4108,8 +4120,8 @@
         </p:nvSpPr>
         <p:spPr>
           <a:xfrm>
-            <a:off x="3419872" y="3100318"/>
-            <a:ext cx="1332148" cy="369332"/>
+            <a:off x="3113838" y="3100318"/>
+            <a:ext cx="1656184" cy="369332"/>
           </a:xfrm>
           <a:prstGeom prst="rect">
             <a:avLst/>
@@ -4125,7 +4137,7 @@
             <a:pPr algn="ctr"/>
             <a:r>
               <a:rPr lang="it-IT" dirty="0" smtClean="0"/>
-              <a:t>mouseout</a:t>
+              <a:t>mouseover(div)</a:t>
             </a:r>
             <a:endParaRPr lang="en-GB" dirty="0"/>
           </a:p>
@@ -4139,8 +4151,8 @@
         </p:nvSpPr>
         <p:spPr>
           <a:xfrm rot="20412096">
-            <a:off x="3216674" y="1627468"/>
-            <a:ext cx="1332148" cy="369332"/>
+            <a:off x="3122497" y="1566636"/>
+            <a:ext cx="1823327" cy="369332"/>
           </a:xfrm>
           <a:prstGeom prst="rect">
             <a:avLst/>
@@ -4156,7 +4168,7 @@
             <a:pPr algn="ctr"/>
             <a:r>
               <a:rPr lang="it-IT" dirty="0" smtClean="0"/>
-              <a:t>mouseout</a:t>
+              <a:t>mouseover(div)</a:t>
             </a:r>
             <a:endParaRPr lang="en-GB" dirty="0"/>
           </a:p>
@@ -4170,8 +4182,8 @@
         </p:nvSpPr>
         <p:spPr>
           <a:xfrm rot="1473323">
-            <a:off x="3216673" y="3805875"/>
-            <a:ext cx="1332148" cy="369332"/>
+            <a:off x="3125572" y="3908369"/>
+            <a:ext cx="1787430" cy="369332"/>
           </a:xfrm>
           <a:prstGeom prst="rect">
             <a:avLst/>
@@ -4187,7 +4199,7 @@
             <a:pPr algn="ctr"/>
             <a:r>
               <a:rPr lang="it-IT" dirty="0" smtClean="0"/>
-              <a:t>mouseout</a:t>
+              <a:t>mouseover(div)</a:t>
             </a:r>
             <a:endParaRPr lang="en-GB" dirty="0"/>
           </a:p>
@@ -4485,6 +4497,294 @@
                 <a:schemeClr val="accent2"/>
               </a:solidFill>
             </a:endParaRPr>
+          </a:p>
+        </p:txBody>
+      </p:sp>
+      <p:cxnSp>
+        <p:nvCxnSpPr>
+          <p:cNvPr id="43" name="Connettore 2 42"/>
+          <p:cNvCxnSpPr/>
+          <p:nvPr/>
+        </p:nvCxnSpPr>
+        <p:spPr>
+          <a:xfrm>
+            <a:off x="6704620" y="1195011"/>
+            <a:ext cx="0" cy="1447417"/>
+          </a:xfrm>
+          <a:prstGeom prst="straightConnector1">
+            <a:avLst/>
+          </a:prstGeom>
+          <a:ln>
+            <a:tailEnd type="arrow"/>
+          </a:ln>
+        </p:spPr>
+        <p:style>
+          <a:lnRef idx="1">
+            <a:schemeClr val="dk1"/>
+          </a:lnRef>
+          <a:fillRef idx="0">
+            <a:schemeClr val="dk1"/>
+          </a:fillRef>
+          <a:effectRef idx="0">
+            <a:schemeClr val="dk1"/>
+          </a:effectRef>
+          <a:fontRef idx="minor">
+            <a:schemeClr val="tx1"/>
+          </a:fontRef>
+        </p:style>
+      </p:cxnSp>
+      <p:cxnSp>
+        <p:nvCxnSpPr>
+          <p:cNvPr id="47" name="Connettore 2 46"/>
+          <p:cNvCxnSpPr/>
+          <p:nvPr/>
+        </p:nvCxnSpPr>
+        <p:spPr>
+          <a:xfrm flipV="1">
+            <a:off x="6704620" y="3314596"/>
+            <a:ext cx="0" cy="1783283"/>
+          </a:xfrm>
+          <a:prstGeom prst="straightConnector1">
+            <a:avLst/>
+          </a:prstGeom>
+          <a:ln>
+            <a:tailEnd type="arrow"/>
+          </a:ln>
+        </p:spPr>
+        <p:style>
+          <a:lnRef idx="1">
+            <a:schemeClr val="dk1"/>
+          </a:lnRef>
+          <a:fillRef idx="0">
+            <a:schemeClr val="dk1"/>
+          </a:fillRef>
+          <a:effectRef idx="0">
+            <a:schemeClr val="dk1"/>
+          </a:effectRef>
+          <a:fontRef idx="minor">
+            <a:schemeClr val="tx1"/>
+          </a:fontRef>
+        </p:style>
+      </p:cxnSp>
+      <p:sp>
+        <p:nvSpPr>
+          <p:cNvPr id="52" name="CasellaDiTesto 51"/>
+          <p:cNvSpPr txBox="1"/>
+          <p:nvPr/>
+        </p:nvSpPr>
+        <p:spPr>
+          <a:xfrm rot="16200000">
+            <a:off x="5778389" y="1764830"/>
+            <a:ext cx="2160240" cy="307777"/>
+          </a:xfrm>
+          <a:prstGeom prst="rect">
+            <a:avLst/>
+          </a:prstGeom>
+          <a:noFill/>
+        </p:spPr>
+        <p:txBody>
+          <a:bodyPr wrap="square" rtlCol="0">
+            <a:spAutoFit/>
+          </a:bodyPr>
+          <a:lstStyle/>
+          <a:p>
+            <a:pPr algn="ctr"/>
+            <a:r>
+              <a:rPr lang="it-IT" sz="1400" dirty="0"/>
+              <a:t>m</a:t>
+            </a:r>
+            <a:r>
+              <a:rPr lang="it-IT" sz="1400" dirty="0" smtClean="0"/>
+              <a:t>ouseover(</a:t>
+            </a:r>
+            <a:r>
+              <a:rPr lang="it-IT" sz="1400" dirty="0" err="1" smtClean="0"/>
+              <a:t>region</a:t>
+            </a:r>
+            <a:r>
+              <a:rPr lang="it-IT" sz="1400" dirty="0" smtClean="0"/>
+              <a:t>)</a:t>
+            </a:r>
+            <a:endParaRPr lang="en-GB" sz="1400" dirty="0"/>
+          </a:p>
+        </p:txBody>
+      </p:sp>
+      <p:sp>
+        <p:nvSpPr>
+          <p:cNvPr id="55" name="CasellaDiTesto 54"/>
+          <p:cNvSpPr txBox="1"/>
+          <p:nvPr/>
+        </p:nvSpPr>
+        <p:spPr>
+          <a:xfrm rot="16200000">
+            <a:off x="5786263" y="4067200"/>
+            <a:ext cx="2160240" cy="307777"/>
+          </a:xfrm>
+          <a:prstGeom prst="rect">
+            <a:avLst/>
+          </a:prstGeom>
+          <a:noFill/>
+        </p:spPr>
+        <p:txBody>
+          <a:bodyPr wrap="square" rtlCol="0">
+            <a:spAutoFit/>
+          </a:bodyPr>
+          <a:lstStyle/>
+          <a:p>
+            <a:pPr algn="ctr"/>
+            <a:r>
+              <a:rPr lang="it-IT" sz="1400" dirty="0" smtClean="0"/>
+              <a:t>m</a:t>
+            </a:r>
+            <a:r>
+              <a:rPr lang="it-IT" sz="1400" dirty="0" smtClean="0"/>
+              <a:t>ouseover(</a:t>
+            </a:r>
+            <a:r>
+              <a:rPr lang="it-IT" sz="1400" dirty="0" err="1" smtClean="0"/>
+              <a:t>region</a:t>
+            </a:r>
+            <a:r>
+              <a:rPr lang="it-IT" sz="1400" dirty="0" smtClean="0"/>
+              <a:t>)</a:t>
+            </a:r>
+            <a:endParaRPr lang="en-GB" sz="1400" dirty="0"/>
+          </a:p>
+        </p:txBody>
+      </p:sp>
+      <p:cxnSp>
+        <p:nvCxnSpPr>
+          <p:cNvPr id="26" name="Connettore 1 25"/>
+          <p:cNvCxnSpPr/>
+          <p:nvPr/>
+        </p:nvCxnSpPr>
+        <p:spPr>
+          <a:xfrm>
+            <a:off x="7164288" y="3140968"/>
+            <a:ext cx="324036" cy="0"/>
+          </a:xfrm>
+          <a:prstGeom prst="line">
+            <a:avLst/>
+          </a:prstGeom>
+        </p:spPr>
+        <p:style>
+          <a:lnRef idx="1">
+            <a:schemeClr val="dk1"/>
+          </a:lnRef>
+          <a:fillRef idx="0">
+            <a:schemeClr val="dk1"/>
+          </a:fillRef>
+          <a:effectRef idx="0">
+            <a:schemeClr val="dk1"/>
+          </a:effectRef>
+          <a:fontRef idx="minor">
+            <a:schemeClr val="tx1"/>
+          </a:fontRef>
+        </p:style>
+      </p:cxnSp>
+      <p:cxnSp>
+        <p:nvCxnSpPr>
+          <p:cNvPr id="30" name="Connettore 1 29"/>
+          <p:cNvCxnSpPr/>
+          <p:nvPr/>
+        </p:nvCxnSpPr>
+        <p:spPr>
+          <a:xfrm flipV="1">
+            <a:off x="7488324" y="2780928"/>
+            <a:ext cx="0" cy="369332"/>
+          </a:xfrm>
+          <a:prstGeom prst="line">
+            <a:avLst/>
+          </a:prstGeom>
+        </p:spPr>
+        <p:style>
+          <a:lnRef idx="1">
+            <a:schemeClr val="dk1"/>
+          </a:lnRef>
+          <a:fillRef idx="0">
+            <a:schemeClr val="dk1"/>
+          </a:fillRef>
+          <a:effectRef idx="0">
+            <a:schemeClr val="dk1"/>
+          </a:effectRef>
+          <a:fontRef idx="minor">
+            <a:schemeClr val="tx1"/>
+          </a:fontRef>
+        </p:style>
+      </p:cxnSp>
+      <p:cxnSp>
+        <p:nvCxnSpPr>
+          <p:cNvPr id="33" name="Connettore 2 32"/>
+          <p:cNvCxnSpPr/>
+          <p:nvPr/>
+        </p:nvCxnSpPr>
+        <p:spPr>
+          <a:xfrm flipH="1">
+            <a:off x="7164288" y="2780928"/>
+            <a:ext cx="324036" cy="0"/>
+          </a:xfrm>
+          <a:prstGeom prst="straightConnector1">
+            <a:avLst/>
+          </a:prstGeom>
+          <a:ln>
+            <a:tailEnd type="arrow"/>
+          </a:ln>
+        </p:spPr>
+        <p:style>
+          <a:lnRef idx="1">
+            <a:schemeClr val="dk1"/>
+          </a:lnRef>
+          <a:fillRef idx="0">
+            <a:schemeClr val="dk1"/>
+          </a:fillRef>
+          <a:effectRef idx="0">
+            <a:schemeClr val="dk1"/>
+          </a:effectRef>
+          <a:fontRef idx="minor">
+            <a:schemeClr val="tx1"/>
+          </a:fontRef>
+        </p:style>
+      </p:cxnSp>
+      <p:sp>
+        <p:nvSpPr>
+          <p:cNvPr id="67" name="CasellaDiTesto 66"/>
+          <p:cNvSpPr txBox="1"/>
+          <p:nvPr/>
+        </p:nvSpPr>
+        <p:spPr>
+          <a:xfrm rot="16200000">
+            <a:off x="6506343" y="2809480"/>
+            <a:ext cx="2160240" cy="307777"/>
+          </a:xfrm>
+          <a:prstGeom prst="rect">
+            <a:avLst/>
+          </a:prstGeom>
+          <a:noFill/>
+        </p:spPr>
+        <p:txBody>
+          <a:bodyPr wrap="square" rtlCol="0">
+            <a:spAutoFit/>
+          </a:bodyPr>
+          <a:lstStyle/>
+          <a:p>
+            <a:pPr algn="ctr"/>
+            <a:r>
+              <a:rPr lang="it-IT" sz="1400" dirty="0"/>
+              <a:t>m</a:t>
+            </a:r>
+            <a:r>
+              <a:rPr lang="it-IT" sz="1400" dirty="0" smtClean="0"/>
+              <a:t>ouseover(</a:t>
+            </a:r>
+            <a:r>
+              <a:rPr lang="it-IT" sz="1400" dirty="0" err="1" smtClean="0"/>
+              <a:t>region</a:t>
+            </a:r>
+            <a:r>
+              <a:rPr lang="it-IT" sz="1400" dirty="0" smtClean="0"/>
+              <a:t>)</a:t>
+            </a:r>
+            <a:endParaRPr lang="en-GB" sz="1400" dirty="0"/>
           </a:p>
         </p:txBody>
       </p:sp>

</xml_diff>